<commit_message>
The final version of our presentation and documentation
</commit_message>
<xml_diff>
--- a/Presentation project SE_final_version.pptx
+++ b/Presentation project SE_final_version.pptx
@@ -4737,50 +4737,31 @@
       </p:sp>
       <p:pic>
         <p:nvPicPr>
-          <p:cNvPr id="2050" name="Picture 2">
+          <p:cNvPr id="5" name="Espace réservé du contenu 4">
             <a:extLst>
               <a:ext uri="{FF2B5EF4-FFF2-40B4-BE49-F238E27FC236}">
-                <a16:creationId xmlns:a16="http://schemas.microsoft.com/office/drawing/2014/main" id="{B6FA6067-4B25-3D48-8708-4362B7BA5940}"/>
+                <a16:creationId xmlns:a16="http://schemas.microsoft.com/office/drawing/2014/main" id="{05F01881-69D6-4F93-A961-0BDB758DEFF4}"/>
               </a:ext>
             </a:extLst>
           </p:cNvPr>
           <p:cNvPicPr>
-            <a:picLocks noGrp="1" noChangeAspect="1" noChangeArrowheads="1"/>
+            <a:picLocks noGrp="1" noChangeAspect="1"/>
           </p:cNvPicPr>
           <p:nvPr>
             <p:ph idx="1"/>
           </p:nvPr>
         </p:nvPicPr>
         <p:blipFill>
-          <a:blip r:embed="rId2">
-            <a:extLst>
-              <a:ext uri="{28A0092B-C50C-407E-A947-70E740481C1C}">
-                <a14:useLocalDpi xmlns:a14="http://schemas.microsoft.com/office/drawing/2010/main" val="0"/>
-              </a:ext>
-            </a:extLst>
-          </a:blip>
+          <a:blip r:embed="rId2"/>
           <a:stretch>
             <a:fillRect/>
           </a:stretch>
         </p:blipFill>
-        <p:spPr bwMode="auto">
+        <p:spPr>
           <a:xfrm>
-            <a:off x="1693332" y="1362074"/>
-            <a:ext cx="9527117" cy="5359004"/>
+            <a:off x="1478431" y="1510303"/>
+            <a:ext cx="9823142" cy="5239766"/>
           </a:xfrm>
-          <a:prstGeom prst="rect">
-            <a:avLst/>
-          </a:prstGeom>
-          <a:noFill/>
-          <a:extLst>
-            <a:ext uri="{909E8E84-426E-40DD-AFC4-6F175D3DCCD1}">
-              <a14:hiddenFill xmlns:a14="http://schemas.microsoft.com/office/drawing/2010/main">
-                <a:solidFill>
-                  <a:srgbClr val="FFFFFF"/>
-                </a:solidFill>
-              </a14:hiddenFill>
-            </a:ext>
-          </a:extLst>
         </p:spPr>
       </p:pic>
     </p:spTree>

</xml_diff>